<commit_message>
Documentation updated with Scheduling
</commit_message>
<xml_diff>
--- a/src/doc/spring-batch.pptx
+++ b/src/doc/spring-batch.pptx
@@ -17,6 +17,7 @@
     <p:sldId id="269" r:id="rId11"/>
     <p:sldId id="265" r:id="rId12"/>
     <p:sldId id="271" r:id="rId13"/>
+    <p:sldId id="272" r:id="rId14"/>
   </p:sldIdLst>
   <p:sldSz cx="9144000" cy="6858000" type="screen4x3"/>
   <p:notesSz cx="6858000" cy="9144000"/>
@@ -4381,6 +4382,317 @@
 </p:sld>
 </file>
 
+<file path=ppt/slides/slide13.xml><?xml version="1.0" encoding="utf-8"?>
+<p:sld xmlns:a="http://schemas.openxmlformats.org/drawingml/2006/main" xmlns:r="http://schemas.openxmlformats.org/officeDocument/2006/relationships" xmlns:p="http://schemas.openxmlformats.org/presentationml/2006/main">
+  <p:cSld>
+    <p:spTree>
+      <p:nvGrpSpPr>
+        <p:cNvPr id="1" name=""/>
+        <p:cNvGrpSpPr/>
+        <p:nvPr/>
+      </p:nvGrpSpPr>
+      <p:grpSpPr>
+        <a:xfrm>
+          <a:off x="0" y="0"/>
+          <a:ext cx="0" cy="0"/>
+          <a:chOff x="0" y="0"/>
+          <a:chExt cx="0" cy="0"/>
+        </a:xfrm>
+      </p:grpSpPr>
+      <p:sp>
+        <p:nvSpPr>
+          <p:cNvPr id="2" name="Titre 1"/>
+          <p:cNvSpPr>
+            <a:spLocks noGrp="1"/>
+          </p:cNvSpPr>
+          <p:nvPr>
+            <p:ph type="title"/>
+          </p:nvPr>
+        </p:nvSpPr>
+        <p:spPr/>
+        <p:txBody>
+          <a:bodyPr/>
+          <a:lstStyle/>
+          <a:p>
+            <a:r>
+              <a:rPr lang="en-US" dirty="0" smtClean="0"/>
+              <a:t>Pour </a:t>
+            </a:r>
+            <a:r>
+              <a:rPr lang="en-US" dirty="0" err="1" smtClean="0"/>
+              <a:t>aller</a:t>
+            </a:r>
+            <a:r>
+              <a:rPr lang="en-US" dirty="0" smtClean="0"/>
+              <a:t> plus loin (quartz)</a:t>
+            </a:r>
+            <a:endParaRPr lang="en-US" dirty="0"/>
+          </a:p>
+        </p:txBody>
+      </p:sp>
+      <p:sp>
+        <p:nvSpPr>
+          <p:cNvPr id="3" name="Espace réservé du contenu 2"/>
+          <p:cNvSpPr>
+            <a:spLocks noGrp="1"/>
+          </p:cNvSpPr>
+          <p:nvPr>
+            <p:ph idx="1"/>
+          </p:nvPr>
+        </p:nvSpPr>
+        <p:spPr/>
+        <p:txBody>
+          <a:bodyPr/>
+          <a:lstStyle/>
+          <a:p>
+            <a:r>
+              <a:rPr lang="en-US" dirty="0" smtClean="0"/>
+              <a:t>La </a:t>
+            </a:r>
+            <a:r>
+              <a:rPr lang="en-US" dirty="0" err="1" smtClean="0"/>
+              <a:t>facilité</a:t>
+            </a:r>
+            <a:r>
+              <a:rPr lang="en-US" dirty="0" smtClean="0"/>
+              <a:t> de </a:t>
+            </a:r>
+            <a:r>
+              <a:rPr lang="en-US" dirty="0" err="1" smtClean="0"/>
+              <a:t>planifier</a:t>
+            </a:r>
+            <a:r>
+              <a:rPr lang="en-US" dirty="0" smtClean="0"/>
+              <a:t> des </a:t>
+            </a:r>
+            <a:r>
+              <a:rPr lang="en-US" dirty="0" err="1" smtClean="0"/>
+              <a:t>exécutions</a:t>
+            </a:r>
+            <a:r>
+              <a:rPr lang="en-US" dirty="0" smtClean="0"/>
+              <a:t> </a:t>
+            </a:r>
+            <a:r>
+              <a:rPr lang="en-US" dirty="0" err="1" smtClean="0"/>
+              <a:t>à</a:t>
+            </a:r>
+            <a:r>
+              <a:rPr lang="en-US" dirty="0" smtClean="0"/>
+              <a:t> travers les annotations a </a:t>
+            </a:r>
+            <a:r>
+              <a:rPr lang="en-US" dirty="0" err="1" smtClean="0"/>
+              <a:t>une</a:t>
+            </a:r>
+            <a:r>
+              <a:rPr lang="en-US" dirty="0" smtClean="0"/>
+              <a:t> </a:t>
+            </a:r>
+            <a:r>
+              <a:rPr lang="en-US" dirty="0" err="1" smtClean="0"/>
+              <a:t>contrepartie</a:t>
+            </a:r>
+            <a:r>
+              <a:rPr lang="en-US" dirty="0" smtClean="0"/>
+              <a:t> : </a:t>
+            </a:r>
+          </a:p>
+          <a:p>
+            <a:pPr algn="ctr"/>
+            <a:r>
+              <a:rPr lang="en-US" dirty="0" err="1" smtClean="0">
+                <a:solidFill>
+                  <a:srgbClr val="FF0000"/>
+                </a:solidFill>
+              </a:rPr>
+              <a:t>Déclarations</a:t>
+            </a:r>
+            <a:r>
+              <a:rPr lang="en-US" dirty="0" smtClean="0">
+                <a:solidFill>
+                  <a:srgbClr val="FF0000"/>
+                </a:solidFill>
+              </a:rPr>
+              <a:t> </a:t>
+            </a:r>
+            <a:r>
+              <a:rPr lang="en-US" dirty="0" err="1" smtClean="0">
+                <a:solidFill>
+                  <a:srgbClr val="FF0000"/>
+                </a:solidFill>
+              </a:rPr>
+              <a:t>statiques</a:t>
+            </a:r>
+            <a:r>
+              <a:rPr lang="en-US" dirty="0" smtClean="0">
+                <a:solidFill>
+                  <a:srgbClr val="FF0000"/>
+                </a:solidFill>
+              </a:rPr>
+              <a:t> des </a:t>
+            </a:r>
+            <a:r>
+              <a:rPr lang="en-US" dirty="0" err="1" smtClean="0">
+                <a:solidFill>
+                  <a:srgbClr val="FF0000"/>
+                </a:solidFill>
+              </a:rPr>
+              <a:t>planifications</a:t>
+            </a:r>
+            <a:endParaRPr lang="en-US" dirty="0" smtClean="0">
+              <a:solidFill>
+                <a:srgbClr val="FF0000"/>
+              </a:solidFill>
+            </a:endParaRPr>
+          </a:p>
+          <a:p>
+            <a:pPr algn="ctr"/>
+            <a:r>
+              <a:rPr lang="en-US" dirty="0" err="1" smtClean="0">
+                <a:solidFill>
+                  <a:srgbClr val="FF0000"/>
+                </a:solidFill>
+              </a:rPr>
+              <a:t>Planification</a:t>
+            </a:r>
+            <a:r>
+              <a:rPr lang="en-US" dirty="0" smtClean="0">
+                <a:solidFill>
+                  <a:srgbClr val="FF0000"/>
+                </a:solidFill>
+              </a:rPr>
+              <a:t> non </a:t>
+            </a:r>
+            <a:r>
+              <a:rPr lang="en-US" dirty="0" err="1" smtClean="0">
+                <a:solidFill>
+                  <a:srgbClr val="FF0000"/>
+                </a:solidFill>
+              </a:rPr>
+              <a:t>distribuée</a:t>
+            </a:r>
+            <a:r>
+              <a:rPr lang="en-US" dirty="0" smtClean="0">
+                <a:solidFill>
+                  <a:srgbClr val="FF0000"/>
+                </a:solidFill>
+              </a:rPr>
+              <a:t> !</a:t>
+            </a:r>
+            <a:endParaRPr lang="en-US" dirty="0">
+              <a:solidFill>
+                <a:srgbClr val="FF0000"/>
+              </a:solidFill>
+            </a:endParaRPr>
+          </a:p>
+          <a:p>
+            <a:endParaRPr lang="en-US" dirty="0" smtClean="0"/>
+          </a:p>
+          <a:p>
+            <a:r>
+              <a:rPr lang="en-US" dirty="0" err="1" smtClean="0"/>
+              <a:t>L’intégration</a:t>
+            </a:r>
+            <a:r>
+              <a:rPr lang="en-US" dirty="0" smtClean="0"/>
+              <a:t> de Quartz </a:t>
+            </a:r>
+            <a:r>
+              <a:rPr lang="en-US" dirty="0" err="1" smtClean="0"/>
+              <a:t>est</a:t>
+            </a:r>
+            <a:r>
+              <a:rPr lang="en-US" dirty="0" smtClean="0"/>
+              <a:t> la solution ! </a:t>
+            </a:r>
+            <a:r>
+              <a:rPr lang="en-US" dirty="0" err="1" smtClean="0"/>
+              <a:t>Mais</a:t>
+            </a:r>
+            <a:r>
+              <a:rPr lang="en-US" dirty="0" smtClean="0"/>
+              <a:t> …</a:t>
+            </a:r>
+          </a:p>
+          <a:p>
+            <a:pPr marL="342900" indent="-342900">
+              <a:buFont typeface="Arial"/>
+              <a:buChar char="•"/>
+            </a:pPr>
+            <a:r>
+              <a:rPr lang="en-US" dirty="0" err="1" smtClean="0"/>
+              <a:t>Utilisation</a:t>
+            </a:r>
+            <a:r>
+              <a:rPr lang="en-US" dirty="0" smtClean="0"/>
+              <a:t> </a:t>
+            </a:r>
+            <a:r>
+              <a:rPr lang="en-US" dirty="0" err="1" smtClean="0"/>
+              <a:t>d’une</a:t>
+            </a:r>
+            <a:r>
+              <a:rPr lang="en-US" dirty="0" smtClean="0"/>
+              <a:t> base de </a:t>
+            </a:r>
+            <a:r>
+              <a:rPr lang="en-US" dirty="0" err="1" smtClean="0"/>
+              <a:t>données</a:t>
+            </a:r>
+            <a:endParaRPr lang="en-US" dirty="0" smtClean="0"/>
+          </a:p>
+          <a:p>
+            <a:pPr marL="342900" indent="-342900">
+              <a:buFont typeface="Arial"/>
+              <a:buChar char="•"/>
+            </a:pPr>
+            <a:r>
+              <a:rPr lang="en-US" dirty="0" smtClean="0"/>
+              <a:t>Architecture et concepts techniques + </a:t>
+            </a:r>
+            <a:r>
+              <a:rPr lang="en-US" dirty="0" err="1" smtClean="0"/>
+              <a:t>complexe</a:t>
+            </a:r>
+            <a:endParaRPr lang="en-US" dirty="0" smtClean="0"/>
+          </a:p>
+          <a:p>
+            <a:pPr marL="342900" indent="-342900">
+              <a:buFont typeface="Arial"/>
+              <a:buChar char="•"/>
+            </a:pPr>
+            <a:r>
+              <a:rPr lang="en-US" dirty="0" smtClean="0"/>
+              <a:t>Plus de </a:t>
+            </a:r>
+            <a:r>
+              <a:rPr lang="en-US" dirty="0" err="1" smtClean="0"/>
+              <a:t>tuyauterie</a:t>
+            </a:r>
+            <a:r>
+              <a:rPr lang="en-US" dirty="0" smtClean="0"/>
+              <a:t> </a:t>
+            </a:r>
+          </a:p>
+          <a:p>
+            <a:endParaRPr lang="en-US" dirty="0"/>
+          </a:p>
+        </p:txBody>
+      </p:sp>
+    </p:spTree>
+    <p:extLst>
+      <p:ext uri="{BB962C8B-B14F-4D97-AF65-F5344CB8AC3E}">
+        <p14:creationId xmlns:p14="http://schemas.microsoft.com/office/powerpoint/2010/main" val="3315172669"/>
+      </p:ext>
+    </p:extLst>
+  </p:cSld>
+  <p:clrMapOvr>
+    <a:masterClrMapping/>
+  </p:clrMapOvr>
+</p:sld>
+</file>
+
 <file path=ppt/slides/slide2.xml><?xml version="1.0" encoding="utf-8"?>
 <p:sld xmlns:a="http://schemas.openxmlformats.org/drawingml/2006/main" xmlns:r="http://schemas.openxmlformats.org/officeDocument/2006/relationships" xmlns:p="http://schemas.openxmlformats.org/presentationml/2006/main">
   <p:cSld>

</xml_diff>